<commit_message>
Updates from & for LambdaJam, NYCCC, NY F# UG, ProgF#.
</commit_message>
<xml_diff>
--- a/Intro to F#/Getting Started With F.pptx
+++ b/Intro to F#/Getting Started With F.pptx
@@ -330,7 +330,7 @@
             <a:fld id="{96DFF08F-DC6B-4601-B491-B0F83F6DD2DA}" type="datetimeFigureOut">
               <a:rPr lang="en-US" smtClean="0"/>
               <a:pPr/>
-              <a:t>4/15/2013</a:t>
+              <a:t>7/12/2013</a:t>
             </a:fld>
             <a:endParaRPr lang="en-US" dirty="0"/>
           </a:p>
@@ -535,7 +535,7 @@
           <a:p>
             <a:fld id="{96DFF08F-DC6B-4601-B491-B0F83F6DD2DA}" type="datetimeFigureOut">
               <a:rPr lang="en-US" smtClean="0"/>
-              <a:t>4/15/2013</a:t>
+              <a:t>7/12/2013</a:t>
             </a:fld>
             <a:endParaRPr lang="en-US"/>
           </a:p>
@@ -715,7 +715,7 @@
           <a:p>
             <a:fld id="{96DFF08F-DC6B-4601-B491-B0F83F6DD2DA}" type="datetimeFigureOut">
               <a:rPr lang="en-US" smtClean="0"/>
-              <a:t>4/15/2013</a:t>
+              <a:t>7/12/2013</a:t>
             </a:fld>
             <a:endParaRPr lang="en-US"/>
           </a:p>
@@ -920,7 +920,7 @@
           <a:p>
             <a:fld id="{96DFF08F-DC6B-4601-B491-B0F83F6DD2DA}" type="datetimeFigureOut">
               <a:rPr lang="en-US" smtClean="0"/>
-              <a:t>4/15/2013</a:t>
+              <a:t>7/12/2013</a:t>
             </a:fld>
             <a:endParaRPr lang="en-US"/>
           </a:p>
@@ -1233,7 +1233,7 @@
           <a:p>
             <a:fld id="{96DFF08F-DC6B-4601-B491-B0F83F6DD2DA}" type="datetimeFigureOut">
               <a:rPr lang="en-US" smtClean="0"/>
-              <a:t>4/15/2013</a:t>
+              <a:t>7/12/2013</a:t>
             </a:fld>
             <a:endParaRPr lang="en-US"/>
           </a:p>
@@ -1500,7 +1500,7 @@
           <a:p>
             <a:fld id="{96DFF08F-DC6B-4601-B491-B0F83F6DD2DA}" type="datetimeFigureOut">
               <a:rPr lang="en-US" smtClean="0"/>
-              <a:t>4/15/2013</a:t>
+              <a:t>7/12/2013</a:t>
             </a:fld>
             <a:endParaRPr lang="en-US"/>
           </a:p>
@@ -1876,7 +1876,7 @@
           <a:p>
             <a:fld id="{96DFF08F-DC6B-4601-B491-B0F83F6DD2DA}" type="datetimeFigureOut">
               <a:rPr lang="en-US" smtClean="0"/>
-              <a:t>4/15/2013</a:t>
+              <a:t>7/12/2013</a:t>
             </a:fld>
             <a:endParaRPr lang="en-US" dirty="0"/>
           </a:p>
@@ -2017,7 +2017,7 @@
           <a:p>
             <a:fld id="{96DFF08F-DC6B-4601-B491-B0F83F6DD2DA}" type="datetimeFigureOut">
               <a:rPr lang="en-US" smtClean="0"/>
-              <a:t>4/15/2013</a:t>
+              <a:t>7/12/2013</a:t>
             </a:fld>
             <a:endParaRPr lang="en-US"/>
           </a:p>
@@ -2112,7 +2112,7 @@
           <a:p>
             <a:fld id="{96DFF08F-DC6B-4601-B491-B0F83F6DD2DA}" type="datetimeFigureOut">
               <a:rPr lang="en-US" smtClean="0"/>
-              <a:t>4/15/2013</a:t>
+              <a:t>7/12/2013</a:t>
             </a:fld>
             <a:endParaRPr lang="en-US"/>
           </a:p>
@@ -2365,7 +2365,7 @@
           <a:p>
             <a:fld id="{96DFF08F-DC6B-4601-B491-B0F83F6DD2DA}" type="datetimeFigureOut">
               <a:rPr lang="en-US" smtClean="0"/>
-              <a:t>4/15/2013</a:t>
+              <a:t>7/12/2013</a:t>
             </a:fld>
             <a:endParaRPr lang="en-US"/>
           </a:p>
@@ -2689,7 +2689,7 @@
           <a:p>
             <a:fld id="{96DFF08F-DC6B-4601-B491-B0F83F6DD2DA}" type="datetimeFigureOut">
               <a:rPr lang="en-US" smtClean="0"/>
-              <a:t>4/15/2013</a:t>
+              <a:t>7/12/2013</a:t>
             </a:fld>
             <a:endParaRPr lang="en-US" dirty="0"/>
           </a:p>
@@ -2940,7 +2940,7 @@
             <a:fld id="{96DFF08F-DC6B-4601-B491-B0F83F6DD2DA}" type="datetimeFigureOut">
               <a:rPr lang="en-US" smtClean="0"/>
               <a:pPr/>
-              <a:t>4/15/2013</a:t>
+              <a:t>7/12/2013</a:t>
             </a:fld>
             <a:endParaRPr lang="en-US" dirty="0"/>
           </a:p>
@@ -3493,6 +3493,17 @@
               <a:rPr lang="en-US" dirty="0" err="1" smtClean="0"/>
               <a:t>rachelreese</a:t>
             </a:r>
+            <a:endParaRPr lang="en-US" dirty="0" smtClean="0"/>
+          </a:p>
+          <a:p>
+            <a:r>
+              <a:rPr lang="en-US" dirty="0" smtClean="0"/>
+              <a:t>github.com/</a:t>
+            </a:r>
+            <a:r>
+              <a:rPr lang="en-US" dirty="0" err="1" smtClean="0"/>
+              <a:t>rachelreese</a:t>
+            </a:r>
             <a:endParaRPr lang="en-US" dirty="0"/>
           </a:p>
         </p:txBody>
@@ -3662,7 +3673,6 @@
               <a:rPr lang="en-US" dirty="0" smtClean="0"/>
               <a:t>Concurrency &amp; parallelization. </a:t>
             </a:r>
-            <a:endParaRPr lang="en-US" dirty="0" smtClean="0"/>
           </a:p>
           <a:p>
             <a:pPr marL="0" indent="0">
@@ -4026,11 +4036,11 @@
             </a:pPr>
             <a:r>
               <a:rPr lang="en-US" dirty="0" smtClean="0"/>
-              <a:t>Easy </a:t>
+              <a:t>Easy to </a:t>
             </a:r>
             <a:r>
               <a:rPr lang="en-US" dirty="0" smtClean="0"/>
-              <a:t>to parallelization! </a:t>
+              <a:t>parallelize! </a:t>
             </a:r>
             <a:endParaRPr lang="en-US" dirty="0"/>
           </a:p>
@@ -4593,6 +4603,17 @@
             <a:r>
               <a:rPr lang="en-US" dirty="0" smtClean="0"/>
               <a:t>rachelree.se, @</a:t>
+            </a:r>
+            <a:r>
+              <a:rPr lang="en-US" dirty="0" err="1" smtClean="0"/>
+              <a:t>rachelreese</a:t>
+            </a:r>
+            <a:endParaRPr lang="en-US" dirty="0" smtClean="0"/>
+          </a:p>
+          <a:p>
+            <a:r>
+              <a:rPr lang="en-US" dirty="0" smtClean="0"/>
+              <a:t>github.com/</a:t>
             </a:r>
             <a:r>
               <a:rPr lang="en-US" dirty="0" err="1" smtClean="0"/>

</xml_diff>